<commit_message>
Developer guide: update model component section
AddressBook previously had a UniqueTagList linked to it, which was
reflected in the model component diagram.

Since AddressBook does not use a master tag list anymore, the model
component diagram is not consistent with the program.

Let's update the model component section in the developer guide.
</commit_message>
<xml_diff>
--- a/docs/diagrams/ModelComponentClassDiagram.pptx
+++ b/docs/diagrams/ModelComponentClassDiagram.pptx
@@ -208,7 +208,7 @@
           <a:p>
             <a:fld id="{F5CC4B3F-88C1-4FFA-B1B6-F41C21DC6924}" type="datetimeFigureOut">
               <a:rPr lang="en-US" smtClean="0"/>
-              <a:t>1/1/18</a:t>
+              <a:t>3/23/2018</a:t>
             </a:fld>
             <a:endParaRPr lang="en-US"/>
           </a:p>
@@ -272,38 +272,37 @@
           <a:p>
             <a:pPr lvl="0"/>
             <a:r>
-              <a:rPr lang="en-US" smtClean="0"/>
+              <a:rPr lang="en-US"/>
               <a:t>Click to edit Master text styles</a:t>
             </a:r>
           </a:p>
           <a:p>
             <a:pPr lvl="1"/>
             <a:r>
-              <a:rPr lang="en-US" smtClean="0"/>
+              <a:rPr lang="en-US"/>
               <a:t>Second level</a:t>
             </a:r>
           </a:p>
           <a:p>
             <a:pPr lvl="2"/>
             <a:r>
-              <a:rPr lang="en-US" smtClean="0"/>
+              <a:rPr lang="en-US"/>
               <a:t>Third level</a:t>
             </a:r>
           </a:p>
           <a:p>
             <a:pPr lvl="3"/>
             <a:r>
-              <a:rPr lang="en-US" smtClean="0"/>
+              <a:rPr lang="en-US"/>
               <a:t>Fourth level</a:t>
             </a:r>
           </a:p>
           <a:p>
             <a:pPr lvl="4"/>
             <a:r>
-              <a:rPr lang="en-US" smtClean="0"/>
+              <a:rPr lang="en-US"/>
               <a:t>Fifth level</a:t>
             </a:r>
-            <a:endParaRPr lang="en-US"/>
           </a:p>
         </p:txBody>
       </p:sp>
@@ -514,10 +513,9 @@
           <a:lstStyle/>
           <a:p>
             <a:r>
-              <a:rPr lang="en-US" smtClean="0"/>
+              <a:rPr lang="en-US"/>
               <a:t>Click to edit Master title style</a:t>
             </a:r>
-            <a:endParaRPr lang="en-US"/>
           </a:p>
         </p:txBody>
       </p:sp>
@@ -633,10 +631,9 @@
           </a:lstStyle>
           <a:p>
             <a:r>
-              <a:rPr lang="en-US" smtClean="0"/>
+              <a:rPr lang="en-US"/>
               <a:t>Click to edit Master subtitle style</a:t>
             </a:r>
-            <a:endParaRPr lang="en-US"/>
           </a:p>
         </p:txBody>
       </p:sp>
@@ -657,7 +654,7 @@
           <a:p>
             <a:fld id="{78C97017-6FC3-485B-9764-EAC9E56C1D49}" type="datetimeFigureOut">
               <a:rPr lang="en-US" smtClean="0"/>
-              <a:t>1/1/18</a:t>
+              <a:t>3/23/2018</a:t>
             </a:fld>
             <a:endParaRPr lang="en-US"/>
           </a:p>
@@ -751,10 +748,9 @@
           <a:lstStyle/>
           <a:p>
             <a:r>
-              <a:rPr lang="en-US" smtClean="0"/>
+              <a:rPr lang="en-US"/>
               <a:t>Click to edit Master title style</a:t>
             </a:r>
-            <a:endParaRPr lang="en-US"/>
           </a:p>
         </p:txBody>
       </p:sp>
@@ -775,38 +771,37 @@
           <a:p>
             <a:pPr lvl="0"/>
             <a:r>
-              <a:rPr lang="en-US" smtClean="0"/>
+              <a:rPr lang="en-US"/>
               <a:t>Click to edit Master text styles</a:t>
             </a:r>
           </a:p>
           <a:p>
             <a:pPr lvl="1"/>
             <a:r>
-              <a:rPr lang="en-US" smtClean="0"/>
+              <a:rPr lang="en-US"/>
               <a:t>Second level</a:t>
             </a:r>
           </a:p>
           <a:p>
             <a:pPr lvl="2"/>
             <a:r>
-              <a:rPr lang="en-US" smtClean="0"/>
+              <a:rPr lang="en-US"/>
               <a:t>Third level</a:t>
             </a:r>
           </a:p>
           <a:p>
             <a:pPr lvl="3"/>
             <a:r>
-              <a:rPr lang="en-US" smtClean="0"/>
+              <a:rPr lang="en-US"/>
               <a:t>Fourth level</a:t>
             </a:r>
           </a:p>
           <a:p>
             <a:pPr lvl="4"/>
             <a:r>
-              <a:rPr lang="en-US" smtClean="0"/>
+              <a:rPr lang="en-US"/>
               <a:t>Fifth level</a:t>
             </a:r>
-            <a:endParaRPr lang="en-US"/>
           </a:p>
         </p:txBody>
       </p:sp>
@@ -827,7 +822,7 @@
           <a:p>
             <a:fld id="{78C97017-6FC3-485B-9764-EAC9E56C1D49}" type="datetimeFigureOut">
               <a:rPr lang="en-US" smtClean="0"/>
-              <a:t>1/1/18</a:t>
+              <a:t>3/23/2018</a:t>
             </a:fld>
             <a:endParaRPr lang="en-US"/>
           </a:p>
@@ -926,10 +921,9 @@
           <a:lstStyle/>
           <a:p>
             <a:r>
-              <a:rPr lang="en-US" smtClean="0"/>
+              <a:rPr lang="en-US"/>
               <a:t>Click to edit Master title style</a:t>
             </a:r>
-            <a:endParaRPr lang="en-US"/>
           </a:p>
         </p:txBody>
       </p:sp>
@@ -955,38 +949,37 @@
           <a:p>
             <a:pPr lvl="0"/>
             <a:r>
-              <a:rPr lang="en-US" smtClean="0"/>
+              <a:rPr lang="en-US"/>
               <a:t>Click to edit Master text styles</a:t>
             </a:r>
           </a:p>
           <a:p>
             <a:pPr lvl="1"/>
             <a:r>
-              <a:rPr lang="en-US" smtClean="0"/>
+              <a:rPr lang="en-US"/>
               <a:t>Second level</a:t>
             </a:r>
           </a:p>
           <a:p>
             <a:pPr lvl="2"/>
             <a:r>
-              <a:rPr lang="en-US" smtClean="0"/>
+              <a:rPr lang="en-US"/>
               <a:t>Third level</a:t>
             </a:r>
           </a:p>
           <a:p>
             <a:pPr lvl="3"/>
             <a:r>
-              <a:rPr lang="en-US" smtClean="0"/>
+              <a:rPr lang="en-US"/>
               <a:t>Fourth level</a:t>
             </a:r>
           </a:p>
           <a:p>
             <a:pPr lvl="4"/>
             <a:r>
-              <a:rPr lang="en-US" smtClean="0"/>
+              <a:rPr lang="en-US"/>
               <a:t>Fifth level</a:t>
             </a:r>
-            <a:endParaRPr lang="en-US"/>
           </a:p>
         </p:txBody>
       </p:sp>
@@ -1007,7 +1000,7 @@
           <a:p>
             <a:fld id="{78C97017-6FC3-485B-9764-EAC9E56C1D49}" type="datetimeFigureOut">
               <a:rPr lang="en-US" smtClean="0"/>
-              <a:t>1/1/18</a:t>
+              <a:t>3/23/2018</a:t>
             </a:fld>
             <a:endParaRPr lang="en-US"/>
           </a:p>
@@ -1101,10 +1094,9 @@
           <a:lstStyle/>
           <a:p>
             <a:r>
-              <a:rPr lang="en-US" smtClean="0"/>
+              <a:rPr lang="en-US"/>
               <a:t>Click to edit Master title style</a:t>
             </a:r>
-            <a:endParaRPr lang="en-US"/>
           </a:p>
         </p:txBody>
       </p:sp>
@@ -1125,38 +1117,37 @@
           <a:p>
             <a:pPr lvl="0"/>
             <a:r>
-              <a:rPr lang="en-US" smtClean="0"/>
+              <a:rPr lang="en-US"/>
               <a:t>Click to edit Master text styles</a:t>
             </a:r>
           </a:p>
           <a:p>
             <a:pPr lvl="1"/>
             <a:r>
-              <a:rPr lang="en-US" smtClean="0"/>
+              <a:rPr lang="en-US"/>
               <a:t>Second level</a:t>
             </a:r>
           </a:p>
           <a:p>
             <a:pPr lvl="2"/>
             <a:r>
-              <a:rPr lang="en-US" smtClean="0"/>
+              <a:rPr lang="en-US"/>
               <a:t>Third level</a:t>
             </a:r>
           </a:p>
           <a:p>
             <a:pPr lvl="3"/>
             <a:r>
-              <a:rPr lang="en-US" smtClean="0"/>
+              <a:rPr lang="en-US"/>
               <a:t>Fourth level</a:t>
             </a:r>
           </a:p>
           <a:p>
             <a:pPr lvl="4"/>
             <a:r>
-              <a:rPr lang="en-US" smtClean="0"/>
+              <a:rPr lang="en-US"/>
               <a:t>Fifth level</a:t>
             </a:r>
-            <a:endParaRPr lang="en-US"/>
           </a:p>
         </p:txBody>
       </p:sp>
@@ -1177,7 +1168,7 @@
           <a:p>
             <a:fld id="{78C97017-6FC3-485B-9764-EAC9E56C1D49}" type="datetimeFigureOut">
               <a:rPr lang="en-US" smtClean="0"/>
-              <a:t>1/1/18</a:t>
+              <a:t>3/23/2018</a:t>
             </a:fld>
             <a:endParaRPr lang="en-US"/>
           </a:p>
@@ -1280,10 +1271,9 @@
           </a:lstStyle>
           <a:p>
             <a:r>
-              <a:rPr lang="en-US" smtClean="0"/>
+              <a:rPr lang="en-US"/>
               <a:t>Click to edit Master title style</a:t>
             </a:r>
-            <a:endParaRPr lang="en-US"/>
           </a:p>
         </p:txBody>
       </p:sp>
@@ -1400,7 +1390,7 @@
           <a:p>
             <a:pPr lvl="0"/>
             <a:r>
-              <a:rPr lang="en-US" smtClean="0"/>
+              <a:rPr lang="en-US"/>
               <a:t>Click to edit Master text styles</a:t>
             </a:r>
           </a:p>
@@ -1423,7 +1413,7 @@
           <a:p>
             <a:fld id="{78C97017-6FC3-485B-9764-EAC9E56C1D49}" type="datetimeFigureOut">
               <a:rPr lang="en-US" smtClean="0"/>
-              <a:t>1/1/18</a:t>
+              <a:t>3/23/2018</a:t>
             </a:fld>
             <a:endParaRPr lang="en-US"/>
           </a:p>
@@ -1517,10 +1507,9 @@
           <a:lstStyle/>
           <a:p>
             <a:r>
-              <a:rPr lang="en-US" smtClean="0"/>
+              <a:rPr lang="en-US"/>
               <a:t>Click to edit Master title style</a:t>
             </a:r>
-            <a:endParaRPr lang="en-US"/>
           </a:p>
         </p:txBody>
       </p:sp>
@@ -1574,38 +1563,37 @@
           <a:p>
             <a:pPr lvl="0"/>
             <a:r>
-              <a:rPr lang="en-US" smtClean="0"/>
+              <a:rPr lang="en-US"/>
               <a:t>Click to edit Master text styles</a:t>
             </a:r>
           </a:p>
           <a:p>
             <a:pPr lvl="1"/>
             <a:r>
-              <a:rPr lang="en-US" smtClean="0"/>
+              <a:rPr lang="en-US"/>
               <a:t>Second level</a:t>
             </a:r>
           </a:p>
           <a:p>
             <a:pPr lvl="2"/>
             <a:r>
-              <a:rPr lang="en-US" smtClean="0"/>
+              <a:rPr lang="en-US"/>
               <a:t>Third level</a:t>
             </a:r>
           </a:p>
           <a:p>
             <a:pPr lvl="3"/>
             <a:r>
-              <a:rPr lang="en-US" smtClean="0"/>
+              <a:rPr lang="en-US"/>
               <a:t>Fourth level</a:t>
             </a:r>
           </a:p>
           <a:p>
             <a:pPr lvl="4"/>
             <a:r>
-              <a:rPr lang="en-US" smtClean="0"/>
+              <a:rPr lang="en-US"/>
               <a:t>Fifth level</a:t>
             </a:r>
-            <a:endParaRPr lang="en-US"/>
           </a:p>
         </p:txBody>
       </p:sp>
@@ -1659,38 +1647,37 @@
           <a:p>
             <a:pPr lvl="0"/>
             <a:r>
-              <a:rPr lang="en-US" smtClean="0"/>
+              <a:rPr lang="en-US"/>
               <a:t>Click to edit Master text styles</a:t>
             </a:r>
           </a:p>
           <a:p>
             <a:pPr lvl="1"/>
             <a:r>
-              <a:rPr lang="en-US" smtClean="0"/>
+              <a:rPr lang="en-US"/>
               <a:t>Second level</a:t>
             </a:r>
           </a:p>
           <a:p>
             <a:pPr lvl="2"/>
             <a:r>
-              <a:rPr lang="en-US" smtClean="0"/>
+              <a:rPr lang="en-US"/>
               <a:t>Third level</a:t>
             </a:r>
           </a:p>
           <a:p>
             <a:pPr lvl="3"/>
             <a:r>
-              <a:rPr lang="en-US" smtClean="0"/>
+              <a:rPr lang="en-US"/>
               <a:t>Fourth level</a:t>
             </a:r>
           </a:p>
           <a:p>
             <a:pPr lvl="4"/>
             <a:r>
-              <a:rPr lang="en-US" smtClean="0"/>
+              <a:rPr lang="en-US"/>
               <a:t>Fifth level</a:t>
             </a:r>
-            <a:endParaRPr lang="en-US"/>
           </a:p>
         </p:txBody>
       </p:sp>
@@ -1711,7 +1698,7 @@
           <a:p>
             <a:fld id="{78C97017-6FC3-485B-9764-EAC9E56C1D49}" type="datetimeFigureOut">
               <a:rPr lang="en-US" smtClean="0"/>
-              <a:t>1/1/18</a:t>
+              <a:t>3/23/2018</a:t>
             </a:fld>
             <a:endParaRPr lang="en-US"/>
           </a:p>
@@ -1809,10 +1796,9 @@
           </a:lstStyle>
           <a:p>
             <a:r>
-              <a:rPr lang="en-US" smtClean="0"/>
+              <a:rPr lang="en-US"/>
               <a:t>Click to edit Master title style</a:t>
             </a:r>
-            <a:endParaRPr lang="en-US"/>
           </a:p>
         </p:txBody>
       </p:sp>
@@ -1875,7 +1861,7 @@
           <a:p>
             <a:pPr lvl="0"/>
             <a:r>
-              <a:rPr lang="en-US" smtClean="0"/>
+              <a:rPr lang="en-US"/>
               <a:t>Click to edit Master text styles</a:t>
             </a:r>
           </a:p>
@@ -1931,38 +1917,37 @@
           <a:p>
             <a:pPr lvl="0"/>
             <a:r>
-              <a:rPr lang="en-US" smtClean="0"/>
+              <a:rPr lang="en-US"/>
               <a:t>Click to edit Master text styles</a:t>
             </a:r>
           </a:p>
           <a:p>
             <a:pPr lvl="1"/>
             <a:r>
-              <a:rPr lang="en-US" smtClean="0"/>
+              <a:rPr lang="en-US"/>
               <a:t>Second level</a:t>
             </a:r>
           </a:p>
           <a:p>
             <a:pPr lvl="2"/>
             <a:r>
-              <a:rPr lang="en-US" smtClean="0"/>
+              <a:rPr lang="en-US"/>
               <a:t>Third level</a:t>
             </a:r>
           </a:p>
           <a:p>
             <a:pPr lvl="3"/>
             <a:r>
-              <a:rPr lang="en-US" smtClean="0"/>
+              <a:rPr lang="en-US"/>
               <a:t>Fourth level</a:t>
             </a:r>
           </a:p>
           <a:p>
             <a:pPr lvl="4"/>
             <a:r>
-              <a:rPr lang="en-US" smtClean="0"/>
+              <a:rPr lang="en-US"/>
               <a:t>Fifth level</a:t>
             </a:r>
-            <a:endParaRPr lang="en-US"/>
           </a:p>
         </p:txBody>
       </p:sp>
@@ -2025,7 +2010,7 @@
           <a:p>
             <a:pPr lvl="0"/>
             <a:r>
-              <a:rPr lang="en-US" smtClean="0"/>
+              <a:rPr lang="en-US"/>
               <a:t>Click to edit Master text styles</a:t>
             </a:r>
           </a:p>
@@ -2081,38 +2066,37 @@
           <a:p>
             <a:pPr lvl="0"/>
             <a:r>
-              <a:rPr lang="en-US" smtClean="0"/>
+              <a:rPr lang="en-US"/>
               <a:t>Click to edit Master text styles</a:t>
             </a:r>
           </a:p>
           <a:p>
             <a:pPr lvl="1"/>
             <a:r>
-              <a:rPr lang="en-US" smtClean="0"/>
+              <a:rPr lang="en-US"/>
               <a:t>Second level</a:t>
             </a:r>
           </a:p>
           <a:p>
             <a:pPr lvl="2"/>
             <a:r>
-              <a:rPr lang="en-US" smtClean="0"/>
+              <a:rPr lang="en-US"/>
               <a:t>Third level</a:t>
             </a:r>
           </a:p>
           <a:p>
             <a:pPr lvl="3"/>
             <a:r>
-              <a:rPr lang="en-US" smtClean="0"/>
+              <a:rPr lang="en-US"/>
               <a:t>Fourth level</a:t>
             </a:r>
           </a:p>
           <a:p>
             <a:pPr lvl="4"/>
             <a:r>
-              <a:rPr lang="en-US" smtClean="0"/>
+              <a:rPr lang="en-US"/>
               <a:t>Fifth level</a:t>
             </a:r>
-            <a:endParaRPr lang="en-US"/>
           </a:p>
         </p:txBody>
       </p:sp>
@@ -2133,7 +2117,7 @@
           <a:p>
             <a:fld id="{78C97017-6FC3-485B-9764-EAC9E56C1D49}" type="datetimeFigureOut">
               <a:rPr lang="en-US" smtClean="0"/>
-              <a:t>1/1/18</a:t>
+              <a:t>3/23/2018</a:t>
             </a:fld>
             <a:endParaRPr lang="en-US"/>
           </a:p>
@@ -2227,10 +2211,9 @@
           <a:lstStyle/>
           <a:p>
             <a:r>
-              <a:rPr lang="en-US" smtClean="0"/>
+              <a:rPr lang="en-US"/>
               <a:t>Click to edit Master title style</a:t>
             </a:r>
-            <a:endParaRPr lang="en-US"/>
           </a:p>
         </p:txBody>
       </p:sp>
@@ -2251,7 +2234,7 @@
           <a:p>
             <a:fld id="{78C97017-6FC3-485B-9764-EAC9E56C1D49}" type="datetimeFigureOut">
               <a:rPr lang="en-US" smtClean="0"/>
-              <a:t>1/1/18</a:t>
+              <a:t>3/23/2018</a:t>
             </a:fld>
             <a:endParaRPr lang="en-US"/>
           </a:p>
@@ -2346,7 +2329,7 @@
           <a:p>
             <a:fld id="{78C97017-6FC3-485B-9764-EAC9E56C1D49}" type="datetimeFigureOut">
               <a:rPr lang="en-US" smtClean="0"/>
-              <a:t>1/1/18</a:t>
+              <a:t>3/23/2018</a:t>
             </a:fld>
             <a:endParaRPr lang="en-US"/>
           </a:p>
@@ -2449,10 +2432,9 @@
           </a:lstStyle>
           <a:p>
             <a:r>
-              <a:rPr lang="en-US" smtClean="0"/>
+              <a:rPr lang="en-US"/>
               <a:t>Click to edit Master title style</a:t>
             </a:r>
-            <a:endParaRPr lang="en-US"/>
           </a:p>
         </p:txBody>
       </p:sp>
@@ -2506,38 +2488,37 @@
           <a:p>
             <a:pPr lvl="0"/>
             <a:r>
-              <a:rPr lang="en-US" smtClean="0"/>
+              <a:rPr lang="en-US"/>
               <a:t>Click to edit Master text styles</a:t>
             </a:r>
           </a:p>
           <a:p>
             <a:pPr lvl="1"/>
             <a:r>
-              <a:rPr lang="en-US" smtClean="0"/>
+              <a:rPr lang="en-US"/>
               <a:t>Second level</a:t>
             </a:r>
           </a:p>
           <a:p>
             <a:pPr lvl="2"/>
             <a:r>
-              <a:rPr lang="en-US" smtClean="0"/>
+              <a:rPr lang="en-US"/>
               <a:t>Third level</a:t>
             </a:r>
           </a:p>
           <a:p>
             <a:pPr lvl="3"/>
             <a:r>
-              <a:rPr lang="en-US" smtClean="0"/>
+              <a:rPr lang="en-US"/>
               <a:t>Fourth level</a:t>
             </a:r>
           </a:p>
           <a:p>
             <a:pPr lvl="4"/>
             <a:r>
-              <a:rPr lang="en-US" smtClean="0"/>
+              <a:rPr lang="en-US"/>
               <a:t>Fifth level</a:t>
             </a:r>
-            <a:endParaRPr lang="en-US"/>
           </a:p>
         </p:txBody>
       </p:sp>
@@ -2600,7 +2581,7 @@
           <a:p>
             <a:pPr lvl="0"/>
             <a:r>
-              <a:rPr lang="en-US" smtClean="0"/>
+              <a:rPr lang="en-US"/>
               <a:t>Click to edit Master text styles</a:t>
             </a:r>
           </a:p>
@@ -2623,7 +2604,7 @@
           <a:p>
             <a:fld id="{78C97017-6FC3-485B-9764-EAC9E56C1D49}" type="datetimeFigureOut">
               <a:rPr lang="en-US" smtClean="0"/>
-              <a:t>1/1/18</a:t>
+              <a:t>3/23/2018</a:t>
             </a:fld>
             <a:endParaRPr lang="en-US"/>
           </a:p>
@@ -2726,10 +2707,9 @@
           </a:lstStyle>
           <a:p>
             <a:r>
-              <a:rPr lang="en-US" smtClean="0"/>
+              <a:rPr lang="en-US"/>
               <a:t>Click to edit Master title style</a:t>
             </a:r>
-            <a:endParaRPr lang="en-US"/>
           </a:p>
         </p:txBody>
       </p:sp>
@@ -2853,7 +2833,7 @@
           <a:p>
             <a:pPr lvl="0"/>
             <a:r>
-              <a:rPr lang="en-US" smtClean="0"/>
+              <a:rPr lang="en-US"/>
               <a:t>Click to edit Master text styles</a:t>
             </a:r>
           </a:p>
@@ -2876,7 +2856,7 @@
           <a:p>
             <a:fld id="{78C97017-6FC3-485B-9764-EAC9E56C1D49}" type="datetimeFigureOut">
               <a:rPr lang="en-US" smtClean="0"/>
-              <a:t>1/1/18</a:t>
+              <a:t>3/23/2018</a:t>
             </a:fld>
             <a:endParaRPr lang="en-US"/>
           </a:p>
@@ -2985,10 +2965,9 @@
           <a:lstStyle/>
           <a:p>
             <a:r>
-              <a:rPr lang="en-US" smtClean="0"/>
+              <a:rPr lang="en-US"/>
               <a:t>Click to edit Master title style</a:t>
             </a:r>
-            <a:endParaRPr lang="en-US"/>
           </a:p>
         </p:txBody>
       </p:sp>
@@ -3019,38 +2998,37 @@
           <a:p>
             <a:pPr lvl="0"/>
             <a:r>
-              <a:rPr lang="en-US" smtClean="0"/>
+              <a:rPr lang="en-US"/>
               <a:t>Click to edit Master text styles</a:t>
             </a:r>
           </a:p>
           <a:p>
             <a:pPr lvl="1"/>
             <a:r>
-              <a:rPr lang="en-US" smtClean="0"/>
+              <a:rPr lang="en-US"/>
               <a:t>Second level</a:t>
             </a:r>
           </a:p>
           <a:p>
             <a:pPr lvl="2"/>
             <a:r>
-              <a:rPr lang="en-US" smtClean="0"/>
+              <a:rPr lang="en-US"/>
               <a:t>Third level</a:t>
             </a:r>
           </a:p>
           <a:p>
             <a:pPr lvl="3"/>
             <a:r>
-              <a:rPr lang="en-US" smtClean="0"/>
+              <a:rPr lang="en-US"/>
               <a:t>Fourth level</a:t>
             </a:r>
           </a:p>
           <a:p>
             <a:pPr lvl="4"/>
             <a:r>
-              <a:rPr lang="en-US" smtClean="0"/>
+              <a:rPr lang="en-US"/>
               <a:t>Fifth level</a:t>
             </a:r>
-            <a:endParaRPr lang="en-US"/>
           </a:p>
         </p:txBody>
       </p:sp>
@@ -3089,7 +3067,7 @@
           <a:p>
             <a:fld id="{78C97017-6FC3-485B-9764-EAC9E56C1D49}" type="datetimeFigureOut">
               <a:rPr lang="en-US" smtClean="0"/>
-              <a:t>1/1/18</a:t>
+              <a:t>3/23/2018</a:t>
             </a:fld>
             <a:endParaRPr lang="en-US"/>
           </a:p>
@@ -3510,7 +3488,7 @@
           <a:lstStyle/>
           <a:p>
             <a:r>
-              <a:rPr lang="en-US" sz="1200" b="1" dirty="0" smtClean="0">
+              <a:rPr lang="en-US" sz="1200" b="1" dirty="0">
                 <a:solidFill>
                   <a:srgbClr val="7030A0"/>
                 </a:solidFill>
@@ -3533,7 +3511,7 @@
         </p:nvSpPr>
         <p:spPr>
           <a:xfrm>
-            <a:off x="2877180" y="3158440"/>
+            <a:off x="2877180" y="3463240"/>
             <a:ext cx="1093635" cy="346760"/>
           </a:xfrm>
           <a:prstGeom prst="rect">
@@ -3569,7 +3547,7 @@
           <a:p>
             <a:pPr algn="ctr"/>
             <a:r>
-              <a:rPr lang="en-US" sz="1050" dirty="0" err="1" smtClean="0">
+              <a:rPr lang="en-US" sz="1050" dirty="0" err="1">
                 <a:solidFill>
                   <a:schemeClr val="bg1"/>
                 </a:solidFill>
@@ -3592,7 +3570,7 @@
         </p:nvSpPr>
         <p:spPr>
           <a:xfrm rot="16200000">
-            <a:off x="1683963" y="2868687"/>
+            <a:off x="1661548" y="3097750"/>
             <a:ext cx="1093635" cy="346760"/>
           </a:xfrm>
           <a:prstGeom prst="rect">
@@ -3628,7 +3606,7 @@
           <a:p>
             <a:pPr algn="ctr"/>
             <a:r>
-              <a:rPr lang="en-US" sz="1050" dirty="0" err="1" smtClean="0">
+              <a:rPr lang="en-US" sz="1050" dirty="0" err="1">
                 <a:solidFill>
                   <a:schemeClr val="bg1"/>
                 </a:solidFill>
@@ -3647,19 +3625,20 @@
         <p:nvCxnSpPr>
           <p:cNvPr id="107" name="Elbow Connector 106"/>
           <p:cNvCxnSpPr>
+            <a:cxnSpLocks/>
             <a:stCxn id="9" idx="1"/>
+            <a:endCxn id="62" idx="2"/>
           </p:cNvCxnSpPr>
           <p:nvPr/>
         </p:nvCxnSpPr>
         <p:spPr>
           <a:xfrm rot="5400000" flipH="1" flipV="1">
-            <a:off x="4360065" y="1080909"/>
-            <a:ext cx="378691" cy="4637261"/>
-          </a:xfrm>
-          <a:prstGeom prst="bentConnector4">
+            <a:off x="4131507" y="1281685"/>
+            <a:ext cx="613122" cy="4459404"/>
+          </a:xfrm>
+          <a:prstGeom prst="bentConnector3">
             <a:avLst>
-              <a:gd name="adj1" fmla="val -101829"/>
-              <a:gd name="adj2" fmla="val 99976"/>
+              <a:gd name="adj1" fmla="val -26668"/>
             </a:avLst>
           </a:prstGeom>
           <a:ln w="19050">
@@ -3742,7 +3721,7 @@
           <a:p>
             <a:pPr algn="ctr"/>
             <a:r>
-              <a:rPr lang="en-US" sz="1050" dirty="0" smtClean="0">
+              <a:rPr lang="en-US" sz="1050" dirty="0">
                 <a:solidFill>
                   <a:schemeClr val="bg1"/>
                 </a:solidFill>
@@ -3815,8 +3794,8 @@
         </p:nvCxnSpPr>
         <p:spPr>
           <a:xfrm>
-            <a:off x="2656370" y="3326536"/>
-            <a:ext cx="220810" cy="5284"/>
+            <a:off x="2609828" y="3636620"/>
+            <a:ext cx="267352" cy="0"/>
           </a:xfrm>
           <a:prstGeom prst="straightConnector1">
             <a:avLst/>
@@ -3937,7 +3916,7 @@
         </p:nvSpPr>
         <p:spPr>
           <a:xfrm>
-            <a:off x="2420322" y="3239846"/>
+            <a:off x="2373780" y="3549930"/>
             <a:ext cx="236048" cy="173380"/>
           </a:xfrm>
           <a:prstGeom prst="flowChartDecision">
@@ -3982,7 +3961,7 @@
         </p:nvSpPr>
         <p:spPr>
           <a:xfrm>
-            <a:off x="2879490" y="2627420"/>
+            <a:off x="2873582" y="2831936"/>
             <a:ext cx="1093635" cy="346760"/>
           </a:xfrm>
           <a:prstGeom prst="rect">
@@ -4015,7 +3994,7 @@
           <a:p>
             <a:pPr algn="ctr"/>
             <a:r>
-              <a:rPr lang="en-US" sz="1050" dirty="0" err="1" smtClean="0">
+              <a:rPr lang="en-US" sz="1050" dirty="0" err="1">
                 <a:solidFill>
                   <a:srgbClr val="7030A0"/>
                 </a:solidFill>
@@ -4041,8 +4020,8 @@
         </p:nvCxnSpPr>
         <p:spPr>
           <a:xfrm>
-            <a:off x="2658680" y="2795516"/>
-            <a:ext cx="220810" cy="5284"/>
+            <a:off x="2624360" y="3003033"/>
+            <a:ext cx="249222" cy="2283"/>
           </a:xfrm>
           <a:prstGeom prst="straightConnector1">
             <a:avLst/>
@@ -4079,7 +4058,7 @@
         </p:nvSpPr>
         <p:spPr>
           <a:xfrm>
-            <a:off x="2422632" y="2708826"/>
+            <a:off x="2388312" y="2916343"/>
             <a:ext cx="236048" cy="173380"/>
           </a:xfrm>
           <a:prstGeom prst="flowChartDecision">
@@ -4157,7 +4136,7 @@
           <a:p>
             <a:pPr algn="ctr"/>
             <a:r>
-              <a:rPr lang="en-US" sz="1050" dirty="0" err="1" smtClean="0">
+              <a:rPr lang="en-US" sz="1050" dirty="0" err="1">
                 <a:solidFill>
                   <a:srgbClr val="7030A0"/>
                 </a:solidFill>
@@ -4180,7 +4159,7 @@
         </p:nvSpPr>
         <p:spPr>
           <a:xfrm>
-            <a:off x="3984303" y="2673991"/>
+            <a:off x="3977259" y="2932345"/>
             <a:ext cx="236048" cy="173380"/>
           </a:xfrm>
           <a:prstGeom prst="flowChartDecision">
@@ -4230,8 +4209,8 @@
         </p:nvCxnSpPr>
         <p:spPr>
           <a:xfrm>
-            <a:off x="4220351" y="2760681"/>
-            <a:ext cx="266666" cy="260070"/>
+            <a:off x="4213307" y="3019035"/>
+            <a:ext cx="273710" cy="1716"/>
           </a:xfrm>
           <a:prstGeom prst="bentConnector3">
             <a:avLst/>
@@ -4262,14 +4241,14 @@
       </p:cxnSp>
       <p:sp>
         <p:nvSpPr>
-          <p:cNvPr id="57" name="Rectangle 8"/>
+          <p:cNvPr id="62" name="Rectangle 8"/>
           <p:cNvSpPr/>
           <p:nvPr/>
         </p:nvSpPr>
         <p:spPr>
           <a:xfrm>
-            <a:off x="4477328" y="2280569"/>
-            <a:ext cx="1156969" cy="346760"/>
+            <a:off x="6313677" y="2858066"/>
+            <a:ext cx="708186" cy="346760"/>
           </a:xfrm>
           <a:prstGeom prst="rect">
             <a:avLst/>
@@ -4301,12 +4280,12 @@
           <a:p>
             <a:pPr algn="ctr"/>
             <a:r>
-              <a:rPr lang="en-US" sz="1050" dirty="0" err="1" smtClean="0">
+              <a:rPr lang="en-US" sz="1050" dirty="0">
                 <a:solidFill>
                   <a:srgbClr val="7030A0"/>
                 </a:solidFill>
               </a:rPr>
-              <a:t>UniqueTagList</a:t>
+              <a:t>Person</a:t>
             </a:r>
             <a:endParaRPr lang="en-SG" sz="1050" dirty="0">
               <a:solidFill>
@@ -4316,24 +4295,67 @@
           </a:p>
         </p:txBody>
       </p:sp>
+      <p:sp>
+        <p:nvSpPr>
+          <p:cNvPr id="63" name="Flowchart: Decision 96"/>
+          <p:cNvSpPr/>
+          <p:nvPr/>
+        </p:nvSpPr>
+        <p:spPr>
+          <a:xfrm>
+            <a:off x="5653118" y="2942885"/>
+            <a:ext cx="236048" cy="173380"/>
+          </a:xfrm>
+          <a:prstGeom prst="flowChartDecision">
+            <a:avLst/>
+          </a:prstGeom>
+          <a:noFill/>
+          <a:ln w="19050">
+            <a:solidFill>
+              <a:srgbClr val="7030A0"/>
+            </a:solidFill>
+          </a:ln>
+          <a:effectLst/>
+        </p:spPr>
+        <p:style>
+          <a:lnRef idx="1">
+            <a:schemeClr val="accent6"/>
+          </a:lnRef>
+          <a:fillRef idx="2">
+            <a:schemeClr val="accent6"/>
+          </a:fillRef>
+          <a:effectRef idx="1">
+            <a:schemeClr val="accent6"/>
+          </a:effectRef>
+          <a:fontRef idx="minor">
+            <a:schemeClr val="dk1"/>
+          </a:fontRef>
+        </p:style>
+        <p:txBody>
+          <a:bodyPr rtlCol="0" anchor="ctr"/>
+          <a:lstStyle/>
+          <a:p>
+            <a:pPr algn="ctr"/>
+            <a:endParaRPr lang="en-US" sz="1050"/>
+          </a:p>
+        </p:txBody>
+      </p:sp>
       <p:cxnSp>
         <p:nvCxnSpPr>
-          <p:cNvPr id="59" name="Elbow Connector 58"/>
+          <p:cNvPr id="64" name="Elbow Connector 63"/>
           <p:cNvCxnSpPr>
-            <a:stCxn id="51" idx="3"/>
-            <a:endCxn id="57" idx="1"/>
+            <a:stCxn id="63" idx="3"/>
+            <a:endCxn id="62" idx="1"/>
           </p:cNvCxnSpPr>
           <p:nvPr/>
         </p:nvCxnSpPr>
         <p:spPr>
-          <a:xfrm flipV="1">
-            <a:off x="4220351" y="2453949"/>
-            <a:ext cx="256977" cy="306732"/>
+          <a:xfrm>
+            <a:off x="5889166" y="3029575"/>
+            <a:ext cx="424511" cy="1871"/>
           </a:xfrm>
           <a:prstGeom prst="bentConnector3">
-            <a:avLst>
-              <a:gd name="adj1" fmla="val 50000"/>
-            </a:avLst>
+            <a:avLst/>
           </a:prstGeom>
           <a:ln w="19050">
             <a:solidFill>
@@ -4361,14 +4383,14 @@
       </p:cxnSp>
       <p:sp>
         <p:nvSpPr>
-          <p:cNvPr id="62" name="Rectangle 8"/>
+          <p:cNvPr id="76" name="Rectangle 8"/>
           <p:cNvSpPr/>
           <p:nvPr/>
         </p:nvSpPr>
         <p:spPr>
           <a:xfrm>
-            <a:off x="6313677" y="2858066"/>
-            <a:ext cx="708186" cy="346760"/>
+            <a:off x="7712397" y="2564238"/>
+            <a:ext cx="708186" cy="285783"/>
           </a:xfrm>
           <a:prstGeom prst="rect">
             <a:avLst/>
@@ -4400,12 +4422,12 @@
           <a:p>
             <a:pPr algn="ctr"/>
             <a:r>
-              <a:rPr lang="en-US" sz="1050" dirty="0" smtClean="0">
+              <a:rPr lang="en-US" sz="1050" dirty="0">
                 <a:solidFill>
                   <a:srgbClr val="7030A0"/>
                 </a:solidFill>
               </a:rPr>
-              <a:t>Person</a:t>
+              <a:t>Name</a:t>
             </a:r>
             <a:endParaRPr lang="en-SG" sz="1050" dirty="0">
               <a:solidFill>
@@ -4417,19 +4439,21 @@
       </p:sp>
       <p:sp>
         <p:nvSpPr>
-          <p:cNvPr id="63" name="Flowchart: Decision 96"/>
+          <p:cNvPr id="78" name="Flowchart: Decision 96"/>
           <p:cNvSpPr/>
           <p:nvPr/>
         </p:nvSpPr>
         <p:spPr>
           <a:xfrm>
-            <a:off x="5643227" y="2943979"/>
+            <a:off x="7041947" y="2948201"/>
             <a:ext cx="236048" cy="173380"/>
           </a:xfrm>
           <a:prstGeom prst="flowChartDecision">
             <a:avLst/>
           </a:prstGeom>
-          <a:noFill/>
+          <a:solidFill>
+            <a:srgbClr val="7030A0"/>
+          </a:solidFill>
           <a:ln w="19050">
             <a:solidFill>
               <a:srgbClr val="7030A0"/>
@@ -4462,17 +4486,16 @@
       </p:sp>
       <p:cxnSp>
         <p:nvCxnSpPr>
-          <p:cNvPr id="64" name="Elbow Connector 63"/>
+          <p:cNvPr id="79" name="Elbow Connector 78"/>
           <p:cNvCxnSpPr>
-            <a:stCxn id="63" idx="3"/>
-            <a:endCxn id="62" idx="1"/>
+            <a:cxnSpLocks/>
           </p:cNvCxnSpPr>
           <p:nvPr/>
         </p:nvCxnSpPr>
         <p:spPr>
-          <a:xfrm>
-            <a:off x="5879275" y="3030669"/>
-            <a:ext cx="434402" cy="777"/>
+          <a:xfrm flipV="1">
+            <a:off x="7277995" y="2706821"/>
+            <a:ext cx="434402" cy="327761"/>
           </a:xfrm>
           <a:prstGeom prst="bentConnector3">
             <a:avLst/>
@@ -4503,14 +4526,14 @@
       </p:cxnSp>
       <p:sp>
         <p:nvSpPr>
-          <p:cNvPr id="67" name="Rectangle 8"/>
+          <p:cNvPr id="80" name="Rectangle 8"/>
           <p:cNvSpPr/>
           <p:nvPr/>
         </p:nvSpPr>
         <p:spPr>
           <a:xfrm>
-            <a:off x="5336105" y="1809332"/>
-            <a:ext cx="483700" cy="346760"/>
+            <a:off x="7712397" y="2887216"/>
+            <a:ext cx="708186" cy="285783"/>
           </a:xfrm>
           <a:prstGeom prst="rect">
             <a:avLst/>
@@ -4542,12 +4565,12 @@
           <a:p>
             <a:pPr algn="ctr"/>
             <a:r>
-              <a:rPr lang="en-US" sz="1050" dirty="0" smtClean="0">
+              <a:rPr lang="en-US" sz="1050" dirty="0">
                 <a:solidFill>
                   <a:srgbClr val="7030A0"/>
                 </a:solidFill>
               </a:rPr>
-              <a:t>Tag</a:t>
+              <a:t>Phone</a:t>
             </a:r>
             <a:endParaRPr lang="en-SG" sz="1050" dirty="0">
               <a:solidFill>
@@ -4557,66 +4580,21 @@
           </a:p>
         </p:txBody>
       </p:sp>
-      <p:sp>
-        <p:nvSpPr>
-          <p:cNvPr id="68" name="Flowchart: Decision 96"/>
-          <p:cNvSpPr/>
-          <p:nvPr/>
-        </p:nvSpPr>
-        <p:spPr>
-          <a:xfrm rot="16200000">
-            <a:off x="4921666" y="2066540"/>
-            <a:ext cx="236048" cy="173380"/>
-          </a:xfrm>
-          <a:prstGeom prst="flowChartDecision">
-            <a:avLst/>
-          </a:prstGeom>
-          <a:noFill/>
-          <a:ln w="19050">
-            <a:solidFill>
-              <a:srgbClr val="7030A0"/>
-            </a:solidFill>
-          </a:ln>
-          <a:effectLst/>
-        </p:spPr>
-        <p:style>
-          <a:lnRef idx="1">
-            <a:schemeClr val="accent6"/>
-          </a:lnRef>
-          <a:fillRef idx="2">
-            <a:schemeClr val="accent6"/>
-          </a:fillRef>
-          <a:effectRef idx="1">
-            <a:schemeClr val="accent6"/>
-          </a:effectRef>
-          <a:fontRef idx="minor">
-            <a:schemeClr val="dk1"/>
-          </a:fontRef>
-        </p:style>
-        <p:txBody>
-          <a:bodyPr rtlCol="0" anchor="ctr"/>
-          <a:lstStyle/>
-          <a:p>
-            <a:pPr algn="ctr"/>
-            <a:endParaRPr lang="en-US" sz="1050"/>
-          </a:p>
-        </p:txBody>
-      </p:sp>
       <p:cxnSp>
         <p:nvCxnSpPr>
-          <p:cNvPr id="69" name="Elbow Connector 68"/>
+          <p:cNvPr id="81" name="Elbow Connector 80"/>
           <p:cNvCxnSpPr>
-            <a:stCxn id="68" idx="3"/>
-            <a:endCxn id="67" idx="1"/>
+            <a:stCxn id="78" idx="3"/>
+            <a:endCxn id="80" idx="1"/>
           </p:cNvCxnSpPr>
           <p:nvPr/>
         </p:nvCxnSpPr>
         <p:spPr>
-          <a:xfrm rot="5400000" flipH="1" flipV="1">
-            <a:off x="5161650" y="1860752"/>
-            <a:ext cx="52494" cy="296415"/>
-          </a:xfrm>
-          <a:prstGeom prst="bentConnector2">
+          <a:xfrm flipV="1">
+            <a:off x="7277995" y="3030108"/>
+            <a:ext cx="434402" cy="4783"/>
+          </a:xfrm>
+          <a:prstGeom prst="bentConnector3">
             <a:avLst/>
           </a:prstGeom>
           <a:ln w="19050">
@@ -4645,13 +4623,13 @@
       </p:cxnSp>
       <p:sp>
         <p:nvSpPr>
-          <p:cNvPr id="76" name="Rectangle 8"/>
+          <p:cNvPr id="83" name="Rectangle 8"/>
           <p:cNvSpPr/>
           <p:nvPr/>
         </p:nvSpPr>
         <p:spPr>
           <a:xfrm>
-            <a:off x="7712397" y="2564238"/>
+            <a:off x="7712397" y="3210194"/>
             <a:ext cx="708186" cy="285783"/>
           </a:xfrm>
           <a:prstGeom prst="rect">
@@ -4684,12 +4662,12 @@
           <a:p>
             <a:pPr algn="ctr"/>
             <a:r>
-              <a:rPr lang="en-US" sz="1050" dirty="0" smtClean="0">
+              <a:rPr lang="en-US" sz="1050" dirty="0">
                 <a:solidFill>
                   <a:srgbClr val="7030A0"/>
                 </a:solidFill>
               </a:rPr>
-              <a:t>Name</a:t>
+              <a:t>Email</a:t>
             </a:r>
             <a:endParaRPr lang="en-SG" sz="1050" dirty="0">
               <a:solidFill>
@@ -4699,66 +4677,19 @@
           </a:p>
         </p:txBody>
       </p:sp>
-      <p:sp>
-        <p:nvSpPr>
-          <p:cNvPr id="78" name="Flowchart: Decision 96"/>
-          <p:cNvSpPr/>
-          <p:nvPr/>
-        </p:nvSpPr>
-        <p:spPr>
-          <a:xfrm>
-            <a:off x="7041947" y="2948201"/>
-            <a:ext cx="236048" cy="173380"/>
-          </a:xfrm>
-          <a:prstGeom prst="flowChartDecision">
-            <a:avLst/>
-          </a:prstGeom>
-          <a:solidFill>
-            <a:srgbClr val="7030A0"/>
-          </a:solidFill>
-          <a:ln w="19050">
-            <a:solidFill>
-              <a:srgbClr val="7030A0"/>
-            </a:solidFill>
-          </a:ln>
-          <a:effectLst/>
-        </p:spPr>
-        <p:style>
-          <a:lnRef idx="1">
-            <a:schemeClr val="accent6"/>
-          </a:lnRef>
-          <a:fillRef idx="2">
-            <a:schemeClr val="accent6"/>
-          </a:fillRef>
-          <a:effectRef idx="1">
-            <a:schemeClr val="accent6"/>
-          </a:effectRef>
-          <a:fontRef idx="minor">
-            <a:schemeClr val="dk1"/>
-          </a:fontRef>
-        </p:style>
-        <p:txBody>
-          <a:bodyPr rtlCol="0" anchor="ctr"/>
-          <a:lstStyle/>
-          <a:p>
-            <a:pPr algn="ctr"/>
-            <a:endParaRPr lang="en-US" sz="1050"/>
-          </a:p>
-        </p:txBody>
-      </p:sp>
       <p:cxnSp>
         <p:nvCxnSpPr>
-          <p:cNvPr id="79" name="Elbow Connector 78"/>
+          <p:cNvPr id="84" name="Elbow Connector 83"/>
           <p:cNvCxnSpPr>
             <a:stCxn id="78" idx="3"/>
-            <a:endCxn id="76" idx="1"/>
+            <a:endCxn id="83" idx="1"/>
           </p:cNvCxnSpPr>
           <p:nvPr/>
         </p:nvCxnSpPr>
         <p:spPr>
-          <a:xfrm flipV="1">
-            <a:off x="7277995" y="2707130"/>
-            <a:ext cx="434402" cy="327761"/>
+          <a:xfrm>
+            <a:off x="7277995" y="3034891"/>
+            <a:ext cx="434402" cy="318195"/>
           </a:xfrm>
           <a:prstGeom prst="bentConnector3">
             <a:avLst/>
@@ -4789,13 +4720,13 @@
       </p:cxnSp>
       <p:sp>
         <p:nvSpPr>
-          <p:cNvPr id="80" name="Rectangle 8"/>
+          <p:cNvPr id="85" name="Rectangle 8"/>
           <p:cNvSpPr/>
           <p:nvPr/>
         </p:nvSpPr>
         <p:spPr>
           <a:xfrm>
-            <a:off x="7712397" y="2887216"/>
+            <a:off x="7712397" y="3533171"/>
             <a:ext cx="708186" cy="285783"/>
           </a:xfrm>
           <a:prstGeom prst="rect">
@@ -4828,201 +4759,7 @@
           <a:p>
             <a:pPr algn="ctr"/>
             <a:r>
-              <a:rPr lang="en-US" sz="1050" dirty="0" smtClean="0">
-                <a:solidFill>
-                  <a:srgbClr val="7030A0"/>
-                </a:solidFill>
-              </a:rPr>
-              <a:t>Phone</a:t>
-            </a:r>
-            <a:endParaRPr lang="en-SG" sz="1050" dirty="0">
-              <a:solidFill>
-                <a:srgbClr val="7030A0"/>
-              </a:solidFill>
-            </a:endParaRPr>
-          </a:p>
-        </p:txBody>
-      </p:sp>
-      <p:cxnSp>
-        <p:nvCxnSpPr>
-          <p:cNvPr id="81" name="Elbow Connector 80"/>
-          <p:cNvCxnSpPr>
-            <a:stCxn id="78" idx="3"/>
-            <a:endCxn id="80" idx="1"/>
-          </p:cNvCxnSpPr>
-          <p:nvPr/>
-        </p:nvCxnSpPr>
-        <p:spPr>
-          <a:xfrm flipV="1">
-            <a:off x="7277995" y="3030108"/>
-            <a:ext cx="434402" cy="4783"/>
-          </a:xfrm>
-          <a:prstGeom prst="bentConnector3">
-            <a:avLst/>
-          </a:prstGeom>
-          <a:ln w="19050">
-            <a:solidFill>
-              <a:srgbClr val="7030A0"/>
-            </a:solidFill>
-            <a:headEnd type="none" w="med" len="med"/>
-            <a:tailEnd type="arrow" w="med" len="med"/>
-          </a:ln>
-          <a:effectLst/>
-        </p:spPr>
-        <p:style>
-          <a:lnRef idx="1">
-            <a:schemeClr val="accent2"/>
-          </a:lnRef>
-          <a:fillRef idx="2">
-            <a:schemeClr val="accent2"/>
-          </a:fillRef>
-          <a:effectRef idx="1">
-            <a:schemeClr val="accent2"/>
-          </a:effectRef>
-          <a:fontRef idx="minor">
-            <a:schemeClr val="dk1"/>
-          </a:fontRef>
-        </p:style>
-      </p:cxnSp>
-      <p:sp>
-        <p:nvSpPr>
-          <p:cNvPr id="83" name="Rectangle 8"/>
-          <p:cNvSpPr/>
-          <p:nvPr/>
-        </p:nvSpPr>
-        <p:spPr>
-          <a:xfrm>
-            <a:off x="7712397" y="3210194"/>
-            <a:ext cx="708186" cy="285783"/>
-          </a:xfrm>
-          <a:prstGeom prst="rect">
-            <a:avLst/>
-          </a:prstGeom>
-          <a:ln w="19050">
-            <a:solidFill>
-              <a:srgbClr val="7030A0"/>
-            </a:solidFill>
-          </a:ln>
-          <a:effectLst/>
-        </p:spPr>
-        <p:style>
-          <a:lnRef idx="1">
-            <a:schemeClr val="accent4"/>
-          </a:lnRef>
-          <a:fillRef idx="2">
-            <a:schemeClr val="accent4"/>
-          </a:fillRef>
-          <a:effectRef idx="1">
-            <a:schemeClr val="accent4"/>
-          </a:effectRef>
-          <a:fontRef idx="minor">
-            <a:schemeClr val="dk1"/>
-          </a:fontRef>
-        </p:style>
-        <p:txBody>
-          <a:bodyPr rtlCol="0" anchor="ctr"/>
-          <a:lstStyle/>
-          <a:p>
-            <a:pPr algn="ctr"/>
-            <a:r>
-              <a:rPr lang="en-US" sz="1050" dirty="0" smtClean="0">
-                <a:solidFill>
-                  <a:srgbClr val="7030A0"/>
-                </a:solidFill>
-              </a:rPr>
-              <a:t>Email</a:t>
-            </a:r>
-            <a:endParaRPr lang="en-SG" sz="1050" dirty="0">
-              <a:solidFill>
-                <a:srgbClr val="7030A0"/>
-              </a:solidFill>
-            </a:endParaRPr>
-          </a:p>
-        </p:txBody>
-      </p:sp>
-      <p:cxnSp>
-        <p:nvCxnSpPr>
-          <p:cNvPr id="84" name="Elbow Connector 83"/>
-          <p:cNvCxnSpPr>
-            <a:stCxn id="78" idx="3"/>
-            <a:endCxn id="83" idx="1"/>
-          </p:cNvCxnSpPr>
-          <p:nvPr/>
-        </p:nvCxnSpPr>
-        <p:spPr>
-          <a:xfrm>
-            <a:off x="7277995" y="3034891"/>
-            <a:ext cx="434402" cy="318195"/>
-          </a:xfrm>
-          <a:prstGeom prst="bentConnector3">
-            <a:avLst/>
-          </a:prstGeom>
-          <a:ln w="19050">
-            <a:solidFill>
-              <a:srgbClr val="7030A0"/>
-            </a:solidFill>
-            <a:headEnd type="none" w="med" len="med"/>
-            <a:tailEnd type="arrow" w="med" len="med"/>
-          </a:ln>
-          <a:effectLst/>
-        </p:spPr>
-        <p:style>
-          <a:lnRef idx="1">
-            <a:schemeClr val="accent2"/>
-          </a:lnRef>
-          <a:fillRef idx="2">
-            <a:schemeClr val="accent2"/>
-          </a:fillRef>
-          <a:effectRef idx="1">
-            <a:schemeClr val="accent2"/>
-          </a:effectRef>
-          <a:fontRef idx="minor">
-            <a:schemeClr val="dk1"/>
-          </a:fontRef>
-        </p:style>
-      </p:cxnSp>
-      <p:sp>
-        <p:nvSpPr>
-          <p:cNvPr id="85" name="Rectangle 8"/>
-          <p:cNvSpPr/>
-          <p:nvPr/>
-        </p:nvSpPr>
-        <p:spPr>
-          <a:xfrm>
-            <a:off x="7712397" y="3533171"/>
-            <a:ext cx="708186" cy="285783"/>
-          </a:xfrm>
-          <a:prstGeom prst="rect">
-            <a:avLst/>
-          </a:prstGeom>
-          <a:ln w="19050">
-            <a:solidFill>
-              <a:srgbClr val="7030A0"/>
-            </a:solidFill>
-          </a:ln>
-          <a:effectLst/>
-        </p:spPr>
-        <p:style>
-          <a:lnRef idx="1">
-            <a:schemeClr val="accent4"/>
-          </a:lnRef>
-          <a:fillRef idx="2">
-            <a:schemeClr val="accent4"/>
-          </a:fillRef>
-          <a:effectRef idx="1">
-            <a:schemeClr val="accent4"/>
-          </a:effectRef>
-          <a:fontRef idx="minor">
-            <a:schemeClr val="dk1"/>
-          </a:fontRef>
-        </p:style>
-        <p:txBody>
-          <a:bodyPr rtlCol="0" anchor="ctr"/>
-          <a:lstStyle/>
-          <a:p>
-            <a:pPr algn="ctr"/>
-            <a:r>
-              <a:rPr lang="en-US" sz="1050" dirty="0" smtClean="0">
+              <a:rPr lang="en-US" sz="1050" dirty="0">
                 <a:solidFill>
                   <a:srgbClr val="7030A0"/>
                 </a:solidFill>
@@ -5088,7 +4825,7 @@
         </p:nvCxnSpPr>
         <p:spPr>
           <a:xfrm rot="16200000" flipH="1">
-            <a:off x="3279321" y="2485431"/>
+            <a:off x="3279321" y="2737710"/>
             <a:ext cx="293825" cy="1"/>
           </a:xfrm>
           <a:prstGeom prst="bentConnector3">
@@ -5129,7 +4866,7 @@
         </p:nvSpPr>
         <p:spPr>
           <a:xfrm rot="10800000" flipV="1">
-            <a:off x="3290981" y="2162997"/>
+            <a:off x="3290981" y="2415276"/>
             <a:ext cx="270504" cy="175523"/>
           </a:xfrm>
           <a:prstGeom prst="triangle">
@@ -5177,7 +4914,7 @@
         </p:nvSpPr>
         <p:spPr>
           <a:xfrm>
-            <a:off x="2660303" y="1806470"/>
+            <a:off x="2671139" y="2049107"/>
             <a:ext cx="1539926" cy="346760"/>
           </a:xfrm>
           <a:prstGeom prst="rect">
@@ -5210,7 +4947,7 @@
           <a:p>
             <a:pPr algn="ctr"/>
             <a:r>
-              <a:rPr lang="en-US" sz="1050" dirty="0" smtClean="0">
+              <a:rPr lang="en-US" sz="1050" dirty="0">
                 <a:solidFill>
                   <a:srgbClr val="7030A0"/>
                 </a:solidFill>
@@ -5218,14 +4955,14 @@
               <a:t>&lt;&lt;interface&gt;&gt;</a:t>
             </a:r>
             <a:br>
-              <a:rPr lang="en-US" sz="1050" dirty="0" smtClean="0">
+              <a:rPr lang="en-US" sz="1050" dirty="0">
                 <a:solidFill>
                   <a:srgbClr val="7030A0"/>
                 </a:solidFill>
               </a:rPr>
             </a:br>
             <a:r>
-              <a:rPr lang="en-US" sz="1050" dirty="0" err="1" smtClean="0">
+              <a:rPr lang="en-US" sz="1050" dirty="0" err="1">
                 <a:solidFill>
                   <a:srgbClr val="7030A0"/>
                 </a:solidFill>
@@ -5248,7 +4985,7 @@
         </p:nvSpPr>
         <p:spPr>
           <a:xfrm rot="16200000">
-            <a:off x="6527512" y="3586305"/>
+            <a:off x="6362886" y="3586305"/>
             <a:ext cx="881018" cy="261610"/>
           </a:xfrm>
           <a:prstGeom prst="rect">
@@ -5264,7 +5001,7 @@
           <a:p>
             <a:pPr algn="r"/>
             <a:r>
-              <a:rPr lang="en-US" sz="1100" dirty="0" smtClean="0">
+              <a:rPr lang="en-US" sz="1100" dirty="0">
                 <a:solidFill>
                   <a:srgbClr val="7030A0"/>
                 </a:solidFill>
@@ -5320,20 +5057,12 @@
           <a:p>
             <a:pPr algn="ctr"/>
             <a:r>
-              <a:rPr lang="en-US" sz="1050" dirty="0" smtClean="0">
+              <a:rPr lang="en-US" sz="1050" dirty="0">
                 <a:solidFill>
                   <a:srgbClr val="7030A0"/>
                 </a:solidFill>
               </a:rPr>
               <a:t>&lt;&lt;interface&gt;&gt;</a:t>
-            </a:r>
-            <a:r>
-              <a:rPr lang="en-US" sz="1050">
-                <a:solidFill>
-                  <a:srgbClr val="7030A0"/>
-                </a:solidFill>
-              </a:rPr>
-              <a:t/>
             </a:r>
             <a:br>
               <a:rPr lang="en-US" sz="1050">
@@ -5343,7 +5072,7 @@
               </a:rPr>
             </a:br>
             <a:r>
-              <a:rPr lang="en-US" sz="1050" dirty="0" err="1" smtClean="0">
+              <a:rPr lang="en-US" sz="1050" dirty="0" err="1">
                 <a:solidFill>
                   <a:srgbClr val="7030A0"/>
                 </a:solidFill>
@@ -5400,22 +5129,288 @@
           </a:fontRef>
         </p:style>
       </p:cxnSp>
+      <p:sp>
+        <p:nvSpPr>
+          <p:cNvPr id="54" name="TextBox 53"/>
+          <p:cNvSpPr txBox="1"/>
+          <p:nvPr/>
+        </p:nvSpPr>
+        <p:spPr>
+          <a:xfrm>
+            <a:off x="4324972" y="3058864"/>
+            <a:ext cx="189257" cy="178683"/>
+          </a:xfrm>
+          <a:prstGeom prst="rect">
+            <a:avLst/>
+          </a:prstGeom>
+          <a:noFill/>
+        </p:spPr>
+        <p:txBody>
+          <a:bodyPr wrap="square" lIns="0" tIns="0" rIns="0" bIns="0" rtlCol="0">
+            <a:noAutofit/>
+          </a:bodyPr>
+          <a:lstStyle/>
+          <a:p>
+            <a:pPr algn="ctr"/>
+            <a:r>
+              <a:rPr lang="en-US" sz="1100" dirty="0">
+                <a:solidFill>
+                  <a:srgbClr val="7030A0"/>
+                </a:solidFill>
+              </a:rPr>
+              <a:t>1</a:t>
+            </a:r>
+            <a:endParaRPr lang="en-SG" sz="1100" dirty="0">
+              <a:solidFill>
+                <a:srgbClr val="7030A0"/>
+              </a:solidFill>
+            </a:endParaRPr>
+          </a:p>
+        </p:txBody>
+      </p:sp>
+      <p:sp>
+        <p:nvSpPr>
+          <p:cNvPr id="61" name="TextBox 60"/>
+          <p:cNvSpPr txBox="1"/>
+          <p:nvPr/>
+        </p:nvSpPr>
+        <p:spPr>
+          <a:xfrm>
+            <a:off x="6135256" y="3097917"/>
+            <a:ext cx="189257" cy="178683"/>
+          </a:xfrm>
+          <a:prstGeom prst="rect">
+            <a:avLst/>
+          </a:prstGeom>
+          <a:noFill/>
+        </p:spPr>
+        <p:txBody>
+          <a:bodyPr wrap="square" lIns="0" tIns="0" rIns="0" bIns="0" rtlCol="0">
+            <a:noAutofit/>
+          </a:bodyPr>
+          <a:lstStyle/>
+          <a:p>
+            <a:pPr algn="ctr"/>
+            <a:r>
+              <a:rPr lang="en-US" sz="1100" dirty="0">
+                <a:solidFill>
+                  <a:srgbClr val="7030A0"/>
+                </a:solidFill>
+              </a:rPr>
+              <a:t>*</a:t>
+            </a:r>
+            <a:endParaRPr lang="en-SG" sz="1100" dirty="0">
+              <a:solidFill>
+                <a:srgbClr val="7030A0"/>
+              </a:solidFill>
+            </a:endParaRPr>
+          </a:p>
+        </p:txBody>
+      </p:sp>
+      <p:sp>
+        <p:nvSpPr>
+          <p:cNvPr id="65" name="TextBox 64"/>
+          <p:cNvSpPr txBox="1"/>
+          <p:nvPr/>
+        </p:nvSpPr>
+        <p:spPr>
+          <a:xfrm>
+            <a:off x="2687923" y="2793117"/>
+            <a:ext cx="189257" cy="178683"/>
+          </a:xfrm>
+          <a:prstGeom prst="rect">
+            <a:avLst/>
+          </a:prstGeom>
+          <a:noFill/>
+        </p:spPr>
+        <p:txBody>
+          <a:bodyPr wrap="square" lIns="0" tIns="0" rIns="0" bIns="0" rtlCol="0">
+            <a:noAutofit/>
+          </a:bodyPr>
+          <a:lstStyle/>
+          <a:p>
+            <a:pPr algn="ctr"/>
+            <a:r>
+              <a:rPr lang="en-US" sz="1100" dirty="0">
+                <a:solidFill>
+                  <a:srgbClr val="7030A0"/>
+                </a:solidFill>
+              </a:rPr>
+              <a:t>1</a:t>
+            </a:r>
+            <a:endParaRPr lang="en-SG" sz="1100" dirty="0">
+              <a:solidFill>
+                <a:srgbClr val="7030A0"/>
+              </a:solidFill>
+            </a:endParaRPr>
+          </a:p>
+        </p:txBody>
+      </p:sp>
+      <p:sp>
+        <p:nvSpPr>
+          <p:cNvPr id="66" name="TextBox 65"/>
+          <p:cNvSpPr txBox="1"/>
+          <p:nvPr/>
+        </p:nvSpPr>
+        <p:spPr>
+          <a:xfrm>
+            <a:off x="2707070" y="3667737"/>
+            <a:ext cx="189257" cy="178683"/>
+          </a:xfrm>
+          <a:prstGeom prst="rect">
+            <a:avLst/>
+          </a:prstGeom>
+          <a:noFill/>
+        </p:spPr>
+        <p:txBody>
+          <a:bodyPr wrap="square" lIns="0" tIns="0" rIns="0" bIns="0" rtlCol="0">
+            <a:noAutofit/>
+          </a:bodyPr>
+          <a:lstStyle/>
+          <a:p>
+            <a:pPr algn="ctr"/>
+            <a:r>
+              <a:rPr lang="en-US" sz="1100" dirty="0">
+                <a:solidFill>
+                  <a:srgbClr val="7030A0"/>
+                </a:solidFill>
+              </a:rPr>
+              <a:t>1</a:t>
+            </a:r>
+            <a:endParaRPr lang="en-SG" sz="1100" dirty="0">
+              <a:solidFill>
+                <a:srgbClr val="7030A0"/>
+              </a:solidFill>
+            </a:endParaRPr>
+          </a:p>
+        </p:txBody>
+      </p:sp>
+      <p:sp>
+        <p:nvSpPr>
+          <p:cNvPr id="70" name="TextBox 69"/>
+          <p:cNvSpPr txBox="1"/>
+          <p:nvPr/>
+        </p:nvSpPr>
+        <p:spPr>
+          <a:xfrm>
+            <a:off x="6449896" y="3204826"/>
+            <a:ext cx="189257" cy="178683"/>
+          </a:xfrm>
+          <a:prstGeom prst="rect">
+            <a:avLst/>
+          </a:prstGeom>
+          <a:noFill/>
+        </p:spPr>
+        <p:txBody>
+          <a:bodyPr wrap="square" lIns="0" tIns="0" rIns="0" bIns="0" rtlCol="0">
+            <a:noAutofit/>
+          </a:bodyPr>
+          <a:lstStyle/>
+          <a:p>
+            <a:pPr algn="ctr"/>
+            <a:r>
+              <a:rPr lang="en-US" sz="1100" dirty="0">
+                <a:solidFill>
+                  <a:srgbClr val="7030A0"/>
+                </a:solidFill>
+              </a:rPr>
+              <a:t>1</a:t>
+            </a:r>
+            <a:endParaRPr lang="en-SG" sz="1100" dirty="0">
+              <a:solidFill>
+                <a:srgbClr val="7030A0"/>
+              </a:solidFill>
+            </a:endParaRPr>
+          </a:p>
+        </p:txBody>
+      </p:sp>
+      <p:sp>
+        <p:nvSpPr>
+          <p:cNvPr id="52" name="Rectangle 8">
+            <a:extLst>
+              <a:ext uri="{FF2B5EF4-FFF2-40B4-BE49-F238E27FC236}">
+                <a16:creationId xmlns:a16="http://schemas.microsoft.com/office/drawing/2014/main" id="{ABDCDBD2-131A-4B66-A2F2-43BBEE82C773}"/>
+              </a:ext>
+            </a:extLst>
+          </p:cNvPr>
+          <p:cNvSpPr/>
+          <p:nvPr/>
+        </p:nvSpPr>
+        <p:spPr>
+          <a:xfrm>
+            <a:off x="7712397" y="2228817"/>
+            <a:ext cx="708186" cy="285783"/>
+          </a:xfrm>
+          <a:prstGeom prst="rect">
+            <a:avLst/>
+          </a:prstGeom>
+          <a:ln w="19050">
+            <a:solidFill>
+              <a:srgbClr val="7030A0"/>
+            </a:solidFill>
+          </a:ln>
+          <a:effectLst/>
+        </p:spPr>
+        <p:style>
+          <a:lnRef idx="1">
+            <a:schemeClr val="accent4"/>
+          </a:lnRef>
+          <a:fillRef idx="2">
+            <a:schemeClr val="accent4"/>
+          </a:fillRef>
+          <a:effectRef idx="1">
+            <a:schemeClr val="accent4"/>
+          </a:effectRef>
+          <a:fontRef idx="minor">
+            <a:schemeClr val="dk1"/>
+          </a:fontRef>
+        </p:style>
+        <p:txBody>
+          <a:bodyPr rtlCol="0" anchor="ctr"/>
+          <a:lstStyle/>
+          <a:p>
+            <a:pPr algn="ctr"/>
+            <a:r>
+              <a:rPr lang="en-US" sz="1050" dirty="0">
+                <a:solidFill>
+                  <a:srgbClr val="7030A0"/>
+                </a:solidFill>
+              </a:rPr>
+              <a:t>Tag</a:t>
+            </a:r>
+            <a:endParaRPr lang="en-SG" sz="1050" dirty="0">
+              <a:solidFill>
+                <a:srgbClr val="7030A0"/>
+              </a:solidFill>
+            </a:endParaRPr>
+          </a:p>
+        </p:txBody>
+      </p:sp>
       <p:cxnSp>
         <p:nvCxnSpPr>
-          <p:cNvPr id="50" name="Elbow Connector 49"/>
+          <p:cNvPr id="53" name="Elbow Connector 78">
+            <a:extLst>
+              <a:ext uri="{FF2B5EF4-FFF2-40B4-BE49-F238E27FC236}">
+                <a16:creationId xmlns:a16="http://schemas.microsoft.com/office/drawing/2014/main" id="{B97967F8-618A-448B-81FD-CDFD4AF0EC64}"/>
+              </a:ext>
+            </a:extLst>
+          </p:cNvPr>
           <p:cNvCxnSpPr>
-            <a:stCxn id="62" idx="0"/>
-            <a:endCxn id="57" idx="3"/>
+            <a:cxnSpLocks/>
+            <a:stCxn id="78" idx="3"/>
+            <a:endCxn id="52" idx="1"/>
           </p:cNvCxnSpPr>
           <p:nvPr/>
         </p:nvCxnSpPr>
         <p:spPr>
-          <a:xfrm rot="16200000" flipV="1">
-            <a:off x="5948976" y="2139271"/>
-            <a:ext cx="404117" cy="1033473"/>
-          </a:xfrm>
-          <a:prstGeom prst="bentConnector2">
-            <a:avLst/>
+          <a:xfrm flipV="1">
+            <a:off x="7277995" y="2371709"/>
+            <a:ext cx="434402" cy="663182"/>
+          </a:xfrm>
+          <a:prstGeom prst="bentConnector3">
+            <a:avLst>
+              <a:gd name="adj1" fmla="val 50000"/>
+            </a:avLst>
           </a:prstGeom>
           <a:ln w="19050">
             <a:solidFill>
@@ -5443,13 +5438,19 @@
       </p:cxnSp>
       <p:sp>
         <p:nvSpPr>
-          <p:cNvPr id="11" name="TextBox 10"/>
+          <p:cNvPr id="50" name="TextBox 49">
+            <a:extLst>
+              <a:ext uri="{FF2B5EF4-FFF2-40B4-BE49-F238E27FC236}">
+                <a16:creationId xmlns:a16="http://schemas.microsoft.com/office/drawing/2014/main" id="{B3FA9D57-880F-49C4-AD0B-A64E30D6F403}"/>
+              </a:ext>
+            </a:extLst>
+          </p:cNvPr>
           <p:cNvSpPr txBox="1"/>
           <p:nvPr/>
         </p:nvSpPr>
         <p:spPr>
           <a:xfrm>
-            <a:off x="4324972" y="2191228"/>
+            <a:off x="7466243" y="2255711"/>
             <a:ext cx="189257" cy="178683"/>
           </a:xfrm>
           <a:prstGeom prst="rect">
@@ -5465,285 +5466,12 @@
           <a:p>
             <a:pPr algn="ctr"/>
             <a:r>
-              <a:rPr lang="en-US" sz="1100" dirty="0" smtClean="0">
-                <a:solidFill>
-                  <a:srgbClr val="7030A0"/>
-                </a:solidFill>
-              </a:rPr>
-              <a:t>1</a:t>
-            </a:r>
-            <a:endParaRPr lang="en-SG" sz="1100" dirty="0">
-              <a:solidFill>
-                <a:srgbClr val="7030A0"/>
-              </a:solidFill>
-            </a:endParaRPr>
-          </a:p>
-        </p:txBody>
-      </p:sp>
-      <p:sp>
-        <p:nvSpPr>
-          <p:cNvPr id="54" name="TextBox 53"/>
-          <p:cNvSpPr txBox="1"/>
-          <p:nvPr/>
-        </p:nvSpPr>
-        <p:spPr>
-          <a:xfrm>
-            <a:off x="4324972" y="3058864"/>
-            <a:ext cx="189257" cy="178683"/>
-          </a:xfrm>
-          <a:prstGeom prst="rect">
-            <a:avLst/>
-          </a:prstGeom>
-          <a:noFill/>
-        </p:spPr>
-        <p:txBody>
-          <a:bodyPr wrap="square" lIns="0" tIns="0" rIns="0" bIns="0" rtlCol="0">
-            <a:noAutofit/>
-          </a:bodyPr>
-          <a:lstStyle/>
-          <a:p>
-            <a:pPr algn="ctr"/>
-            <a:r>
-              <a:rPr lang="en-US" sz="1100" dirty="0" smtClean="0">
-                <a:solidFill>
-                  <a:srgbClr val="7030A0"/>
-                </a:solidFill>
-              </a:rPr>
-              <a:t>1</a:t>
-            </a:r>
-            <a:endParaRPr lang="en-SG" sz="1100" dirty="0">
-              <a:solidFill>
-                <a:srgbClr val="7030A0"/>
-              </a:solidFill>
-            </a:endParaRPr>
-          </a:p>
-        </p:txBody>
-      </p:sp>
-      <p:sp>
-        <p:nvSpPr>
-          <p:cNvPr id="56" name="TextBox 55"/>
-          <p:cNvSpPr txBox="1"/>
-          <p:nvPr/>
-        </p:nvSpPr>
-        <p:spPr>
-          <a:xfrm>
-            <a:off x="5689761" y="2495413"/>
-            <a:ext cx="189257" cy="178683"/>
-          </a:xfrm>
-          <a:prstGeom prst="rect">
-            <a:avLst/>
-          </a:prstGeom>
-          <a:noFill/>
-        </p:spPr>
-        <p:txBody>
-          <a:bodyPr wrap="square" lIns="0" tIns="0" rIns="0" bIns="0" rtlCol="0">
-            <a:noAutofit/>
-          </a:bodyPr>
-          <a:lstStyle/>
-          <a:p>
-            <a:pPr algn="ctr"/>
-            <a:r>
-              <a:rPr lang="en-US" sz="1100" dirty="0" smtClean="0">
-                <a:solidFill>
-                  <a:srgbClr val="7030A0"/>
-                </a:solidFill>
-              </a:rPr>
-              <a:t>1</a:t>
-            </a:r>
-            <a:endParaRPr lang="en-SG" sz="1100" dirty="0">
-              <a:solidFill>
-                <a:srgbClr val="7030A0"/>
-              </a:solidFill>
-            </a:endParaRPr>
-          </a:p>
-        </p:txBody>
-      </p:sp>
-      <p:sp>
-        <p:nvSpPr>
-          <p:cNvPr id="60" name="TextBox 59"/>
-          <p:cNvSpPr txBox="1"/>
-          <p:nvPr/>
-        </p:nvSpPr>
-        <p:spPr>
-          <a:xfrm>
-            <a:off x="5163172" y="1778919"/>
-            <a:ext cx="189257" cy="178683"/>
-          </a:xfrm>
-          <a:prstGeom prst="rect">
-            <a:avLst/>
-          </a:prstGeom>
-          <a:noFill/>
-        </p:spPr>
-        <p:txBody>
-          <a:bodyPr wrap="square" lIns="0" tIns="0" rIns="0" bIns="0" rtlCol="0">
-            <a:noAutofit/>
-          </a:bodyPr>
-          <a:lstStyle/>
-          <a:p>
-            <a:pPr algn="ctr"/>
-            <a:r>
-              <a:rPr lang="en-US" sz="1100" dirty="0" smtClean="0">
+              <a:rPr lang="en-US" sz="1100" dirty="0">
                 <a:solidFill>
                   <a:srgbClr val="7030A0"/>
                 </a:solidFill>
               </a:rPr>
               <a:t>*</a:t>
-            </a:r>
-            <a:endParaRPr lang="en-SG" sz="1100" dirty="0">
-              <a:solidFill>
-                <a:srgbClr val="7030A0"/>
-              </a:solidFill>
-            </a:endParaRPr>
-          </a:p>
-        </p:txBody>
-      </p:sp>
-      <p:sp>
-        <p:nvSpPr>
-          <p:cNvPr id="61" name="TextBox 60"/>
-          <p:cNvSpPr txBox="1"/>
-          <p:nvPr/>
-        </p:nvSpPr>
-        <p:spPr>
-          <a:xfrm>
-            <a:off x="6135256" y="3097917"/>
-            <a:ext cx="189257" cy="178683"/>
-          </a:xfrm>
-          <a:prstGeom prst="rect">
-            <a:avLst/>
-          </a:prstGeom>
-          <a:noFill/>
-        </p:spPr>
-        <p:txBody>
-          <a:bodyPr wrap="square" lIns="0" tIns="0" rIns="0" bIns="0" rtlCol="0">
-            <a:noAutofit/>
-          </a:bodyPr>
-          <a:lstStyle/>
-          <a:p>
-            <a:pPr algn="ctr"/>
-            <a:r>
-              <a:rPr lang="en-US" sz="1100" dirty="0" smtClean="0">
-                <a:solidFill>
-                  <a:srgbClr val="7030A0"/>
-                </a:solidFill>
-              </a:rPr>
-              <a:t>*</a:t>
-            </a:r>
-            <a:endParaRPr lang="en-SG" sz="1100" dirty="0">
-              <a:solidFill>
-                <a:srgbClr val="7030A0"/>
-              </a:solidFill>
-            </a:endParaRPr>
-          </a:p>
-        </p:txBody>
-      </p:sp>
-      <p:sp>
-        <p:nvSpPr>
-          <p:cNvPr id="65" name="TextBox 64"/>
-          <p:cNvSpPr txBox="1"/>
-          <p:nvPr/>
-        </p:nvSpPr>
-        <p:spPr>
-          <a:xfrm>
-            <a:off x="2687923" y="2564238"/>
-            <a:ext cx="189257" cy="178683"/>
-          </a:xfrm>
-          <a:prstGeom prst="rect">
-            <a:avLst/>
-          </a:prstGeom>
-          <a:noFill/>
-        </p:spPr>
-        <p:txBody>
-          <a:bodyPr wrap="square" lIns="0" tIns="0" rIns="0" bIns="0" rtlCol="0">
-            <a:noAutofit/>
-          </a:bodyPr>
-          <a:lstStyle/>
-          <a:p>
-            <a:pPr algn="ctr"/>
-            <a:r>
-              <a:rPr lang="en-US" sz="1100" dirty="0" smtClean="0">
-                <a:solidFill>
-                  <a:srgbClr val="7030A0"/>
-                </a:solidFill>
-              </a:rPr>
-              <a:t>1</a:t>
-            </a:r>
-            <a:endParaRPr lang="en-SG" sz="1100" dirty="0">
-              <a:solidFill>
-                <a:srgbClr val="7030A0"/>
-              </a:solidFill>
-            </a:endParaRPr>
-          </a:p>
-        </p:txBody>
-      </p:sp>
-      <p:sp>
-        <p:nvSpPr>
-          <p:cNvPr id="66" name="TextBox 65"/>
-          <p:cNvSpPr txBox="1"/>
-          <p:nvPr/>
-        </p:nvSpPr>
-        <p:spPr>
-          <a:xfrm>
-            <a:off x="2656370" y="3386050"/>
-            <a:ext cx="189257" cy="178683"/>
-          </a:xfrm>
-          <a:prstGeom prst="rect">
-            <a:avLst/>
-          </a:prstGeom>
-          <a:noFill/>
-        </p:spPr>
-        <p:txBody>
-          <a:bodyPr wrap="square" lIns="0" tIns="0" rIns="0" bIns="0" rtlCol="0">
-            <a:noAutofit/>
-          </a:bodyPr>
-          <a:lstStyle/>
-          <a:p>
-            <a:pPr algn="ctr"/>
-            <a:r>
-              <a:rPr lang="en-US" sz="1100" dirty="0" smtClean="0">
-                <a:solidFill>
-                  <a:srgbClr val="7030A0"/>
-                </a:solidFill>
-              </a:rPr>
-              <a:t>1</a:t>
-            </a:r>
-            <a:endParaRPr lang="en-SG" sz="1100" dirty="0">
-              <a:solidFill>
-                <a:srgbClr val="7030A0"/>
-              </a:solidFill>
-            </a:endParaRPr>
-          </a:p>
-        </p:txBody>
-      </p:sp>
-      <p:sp>
-        <p:nvSpPr>
-          <p:cNvPr id="70" name="TextBox 69"/>
-          <p:cNvSpPr txBox="1"/>
-          <p:nvPr/>
-        </p:nvSpPr>
-        <p:spPr>
-          <a:xfrm>
-            <a:off x="6667770" y="3210194"/>
-            <a:ext cx="189257" cy="178683"/>
-          </a:xfrm>
-          <a:prstGeom prst="rect">
-            <a:avLst/>
-          </a:prstGeom>
-          <a:noFill/>
-        </p:spPr>
-        <p:txBody>
-          <a:bodyPr wrap="square" lIns="0" tIns="0" rIns="0" bIns="0" rtlCol="0">
-            <a:noAutofit/>
-          </a:bodyPr>
-          <a:lstStyle/>
-          <a:p>
-            <a:pPr algn="ctr"/>
-            <a:r>
-              <a:rPr lang="en-US" sz="1100" dirty="0" smtClean="0">
-                <a:solidFill>
-                  <a:srgbClr val="7030A0"/>
-                </a:solidFill>
-              </a:rPr>
-              <a:t>1</a:t>
             </a:r>
             <a:endParaRPr lang="en-SG" sz="1100" dirty="0">
               <a:solidFill>
@@ -5763,13 +5491,6 @@
   <p:clrMapOvr>
     <a:masterClrMapping/>
   </p:clrMapOvr>
-  <p:timing>
-    <p:tnLst>
-      <p:par>
-        <p:cTn id="1" dur="indefinite" restart="never" nodeType="tmRoot"/>
-      </p:par>
-    </p:tnLst>
-  </p:timing>
 </p:sld>
 </file>
 

</xml_diff>